<commit_message>
Just some minor and not important changes
</commit_message>
<xml_diff>
--- a/Context Papers/ISR_meeting_Context_Awarenes.pptx
+++ b/Context Papers/ISR_meeting_Context_Awarenes.pptx
@@ -202,7 +202,7 @@
           <a:bodyPr anchor="b" bIns="0" lIns="0" rIns="0" tIns="0" wrap="none"/>
           <a:p>
             <a:pPr algn="r"/>
-            <a:fld id="{A1A121C1-C151-4181-81A1-C11141414191}" type="slidenum">
+            <a:fld id="{91B1E1D1-91A1-4131-A161-41A181B1D181}" type="slidenum">
               <a:rPr lang="en-IN"/>
               <a:t>&lt;number&gt;</a:t>
             </a:fld>
@@ -246,7 +246,7 @@
         <p:spPr>
           <a:xfrm>
             <a:off x="756000" y="5078520"/>
-            <a:ext cx="6047640" cy="4811400"/>
+            <a:ext cx="6047640" cy="4811040"/>
           </a:xfrm>
           <a:prstGeom prst="rect">
             <a:avLst/>
@@ -6735,7 +6735,7 @@
                 <a:spcPct val="100000"/>
               </a:lnSpc>
             </a:pPr>
-            <a:fld id="{D1D15131-1161-4171-8101-F1D1B161D121}" type="slidenum">
+            <a:fld id="{5141A1A1-01C1-4151-A131-1171B131C191}" type="slidenum">
               <a:rPr b="1" lang="en-IN" sz="1100">
                 <a:solidFill>
                   <a:srgbClr val="df3832"/>
@@ -7162,7 +7162,7 @@
                 <a:spcPct val="100000"/>
               </a:lnSpc>
             </a:pPr>
-            <a:fld id="{01413151-8131-4131-A131-4171E141A1C1}" type="slidenum">
+            <a:fld id="{A18151B1-B1B1-41B1-A1C1-4121B1110101}" type="slidenum">
               <a:rPr b="1" lang="en-IN" sz="1100">
                 <a:solidFill>
                   <a:srgbClr val="df3832"/>
@@ -7398,7 +7398,7 @@
                 <a:spcPct val="100000"/>
               </a:lnSpc>
             </a:pPr>
-            <a:fld id="{E111A1D1-21D1-41F1-B171-41111131F191}" type="slidenum">
+            <a:fld id="{E1E11100-4101-41E1-9111-6141F1B101B1}" type="slidenum">
               <a:rPr b="1" lang="en-IN" sz="1100">
                 <a:solidFill>
                   <a:srgbClr val="df3832"/>
@@ -13783,7 +13783,7 @@
                 <a:spcPct val="100000"/>
               </a:lnSpc>
             </a:pPr>
-            <a:fld id="{A15121D1-71D1-41D1-91A1-51C1D1F1B141}" type="slidenum">
+            <a:fld id="{416151C1-61C1-41E1-9121-510161418101}" type="slidenum">
               <a:rPr b="1" lang="en-IN" sz="1100">
                 <a:solidFill>
                   <a:srgbClr val="df3832"/>
@@ -13913,7 +13913,7 @@
                 <a:spcPct val="100000"/>
               </a:lnSpc>
             </a:pPr>
-            <a:fld id="{F1417191-D1D1-41E1-9121-71A121E11141}" type="slidenum">
+            <a:fld id="{71F17151-D1F1-41F1-91F1-11C14161C101}" type="slidenum">
               <a:rPr b="1" lang="en-IN" sz="1100">
                 <a:solidFill>
                   <a:srgbClr val="df3832"/>
@@ -14178,7 +14178,7 @@
                 <a:spcPct val="100000"/>
               </a:lnSpc>
             </a:pPr>
-            <a:fld id="{214191B1-31B1-41C1-8141-D1F1F1A111D1}" type="slidenum">
+            <a:fld id="{31C1B1B1-4191-4141-8131-912171613111}" type="slidenum">
               <a:rPr b="1" lang="en-IN" sz="1100">
                 <a:solidFill>
                   <a:srgbClr val="df3832"/>
@@ -14786,7 +14786,7 @@
                 <a:spcPct val="100000"/>
               </a:lnSpc>
             </a:pPr>
-            <a:fld id="{A131A111-3161-4181-81A1-E15111A16161}" type="slidenum">
+            <a:fld id="{71C17121-91B1-4161-91E1-517151F15161}" type="slidenum">
               <a:rPr b="1" lang="en-IN" sz="1100">
                 <a:solidFill>
                   <a:srgbClr val="df3832"/>
@@ -15245,7 +15245,7 @@
                 <a:spcPct val="100000"/>
               </a:lnSpc>
             </a:pPr>
-            <a:fld id="{6171D151-11A1-4101-8111-F1C1418131E1}" type="slidenum">
+            <a:fld id="{91515171-1131-4191-A111-3171E191F151}" type="slidenum">
               <a:rPr b="1" lang="en-IN" sz="1100">
                 <a:solidFill>
                   <a:srgbClr val="df3832"/>
@@ -15650,7 +15650,7 @@
                 <a:spcPct val="100000"/>
               </a:lnSpc>
             </a:pPr>
-            <a:fld id="{318171A1-2181-4111-81C1-2171612101F1}" type="slidenum">
+            <a:fld id="{5191E191-B181-4181-A161-11D14161E131}" type="slidenum">
               <a:rPr b="1" lang="en-IN" sz="1100">
                 <a:solidFill>
                   <a:srgbClr val="df3832"/>
@@ -15988,7 +15988,7 @@
                 <a:spcPct val="100000"/>
               </a:lnSpc>
             </a:pPr>
-            <a:fld id="{E1318101-4161-4101-8191-E171F111B131}" type="slidenum">
+            <a:fld id="{C1612141-01A1-41F1-B131-1171414121F1}" type="slidenum">
               <a:rPr b="1" lang="en-IN" sz="1100">
                 <a:solidFill>
                   <a:srgbClr val="df3832"/>
@@ -16236,7 +16236,7 @@
                 <a:spcPct val="100000"/>
               </a:lnSpc>
             </a:pPr>
-            <a:fld id="{4111B171-1171-4161-81B1-C1A101D11181}" type="slidenum">
+            <a:fld id="{01C13131-5151-4151-A121-A1E1C12181F1}" type="slidenum">
               <a:rPr b="1" lang="en-IN" sz="1100">
                 <a:solidFill>
                   <a:srgbClr val="df3832"/>
@@ -17176,7 +17176,7 @@
                 <a:spcPct val="100000"/>
               </a:lnSpc>
             </a:pPr>
-            <a:fld id="{615161D1-E151-4161-B151-A141E1612131}" type="slidenum">
+            <a:fld id="{2171E131-41B1-4141-B191-E1E1D1615161}" type="slidenum">
               <a:rPr b="1" lang="en-IN" sz="1100">
                 <a:solidFill>
                   <a:srgbClr val="df3832"/>
@@ -17527,7 +17527,7 @@
                 <a:spcPct val="100000"/>
               </a:lnSpc>
             </a:pPr>
-            <a:fld id="{21212131-7181-4141-81E1-71C1B1C141E1}" type="slidenum">
+            <a:fld id="{817141F1-1181-4141-9161-81D1115131F1}" type="slidenum">
               <a:rPr b="1" lang="en-IN" sz="1100">
                 <a:solidFill>
                   <a:srgbClr val="df3832"/>
@@ -18266,7 +18266,7 @@
                 <a:spcPct val="100000"/>
               </a:lnSpc>
             </a:pPr>
-            <a:fld id="{312111E1-11F1-41B1-B181-5121E1B171D1}" type="slidenum">
+            <a:fld id="{01111111-F131-4101-9161-E1B181C161B1}" type="slidenum">
               <a:rPr b="1" lang="en-IN" sz="1100">
                 <a:solidFill>
                   <a:srgbClr val="df3832"/>
@@ -18864,7 +18864,7 @@
                 <a:spcPct val="100000"/>
               </a:lnSpc>
             </a:pPr>
-            <a:fld id="{81D19171-31E1-4121-B121-013191E1D121}" type="slidenum">
+            <a:fld id="{D121E1A1-F1F1-4141-91E1-21513141E1F1}" type="slidenum">
               <a:rPr b="1" lang="en-IN" sz="1100">
                 <a:solidFill>
                   <a:srgbClr val="df3832"/>
@@ -19061,7 +19061,7 @@
                 <a:spcPct val="100000"/>
               </a:lnSpc>
             </a:pPr>
-            <a:fld id="{813161C1-6131-41B1-A141-21A14121F181}" type="slidenum">
+            <a:fld id="{914171B1-C1F1-4161-A1D1-A16181D1E171}" type="slidenum">
               <a:rPr b="1" lang="en-IN" sz="1100">
                 <a:solidFill>
                   <a:srgbClr val="df3832"/>
@@ -19591,7 +19591,7 @@
                 <a:spcPct val="100000"/>
               </a:lnSpc>
             </a:pPr>
-            <a:fld id="{F1716121-3191-4171-A191-21619151A1C1}" type="slidenum">
+            <a:fld id="{F1A151E1-3121-41B1-91A1-E1C181C1F1D1}" type="slidenum">
               <a:rPr b="1" lang="en-IN" sz="1100">
                 <a:solidFill>
                   <a:srgbClr val="df3832"/>
@@ -20044,7 +20044,7 @@
                 <a:spcPct val="100000"/>
               </a:lnSpc>
             </a:pPr>
-            <a:fld id="{C1715101-B181-4131-8191-21F1C1711131}" type="slidenum">
+            <a:fld id="{D151D111-11B1-4181-B161-2101A101E121}" type="slidenum">
               <a:rPr b="1" lang="en-IN" sz="1100">
                 <a:solidFill>
                   <a:srgbClr val="df3832"/>
@@ -20241,7 +20241,7 @@
                 <a:spcPct val="100000"/>
               </a:lnSpc>
             </a:pPr>
-            <a:fld id="{7161F1D1-91D1-41D1-B1D1-B1718171E131}" type="slidenum">
+            <a:fld id="{E1F18161-E191-4191-8121-11516121E151}" type="slidenum">
               <a:rPr b="1" lang="en-IN" sz="1100">
                 <a:solidFill>
                   <a:srgbClr val="df3832"/>
@@ -21241,7 +21241,7 @@
                 <a:spcPct val="100000"/>
               </a:lnSpc>
             </a:pPr>
-            <a:fld id="{116191E1-9181-4151-91E1-91B1D1915181}" type="slidenum">
+            <a:fld id="{91E1C111-A1F1-4161-81F1-A1C121D1E1B1}" type="slidenum">
               <a:rPr b="1" lang="en-IN" sz="1100">
                 <a:solidFill>
                   <a:srgbClr val="df3832"/>
@@ -21269,7 +21269,7 @@
             <a:tbl>
               <a:tblPr/>
               <a:tblGrid>
-                <a:gridCol w="374040"/>
+                <a:gridCol w="661680"/>
                 <a:gridCol w="616320"/>
                 <a:gridCol w="519120"/>
                 <a:gridCol w="658080"/>
@@ -21282,7 +21282,7 @@
                 <a:gridCol w="735480"/>
                 <a:gridCol w="612720"/>
                 <a:gridCol w="1051560"/>
-                <a:gridCol w="1052640"/>
+                <a:gridCol w="743040"/>
               </a:tblGrid>
               <a:tr h="804600">
                 <a:tc>
@@ -22966,6 +22966,35 @@
       </p:graphicFrame>
     </p:spTree>
   </p:cSld>
+  <p:timing>
+    <p:tnLst>
+      <p:par>
+        <p:cTn dur="indefinite" id="31" nodeType="tmRoot" restart="never">
+          <p:childTnLst>
+            <p:seq>
+              <p:cTn id="32" nodeType="mainSeq">
+                <p:childTnLst/>
+              </p:cTn>
+              <p:prevCondLst>
+                <p:cond delay="0" evt="onPrev">
+                  <p:tgtEl>
+                    <p:sldTgt/>
+                  </p:tgtEl>
+                </p:cond>
+              </p:prevCondLst>
+              <p:nextCondLst>
+                <p:cond delay="0" evt="onNext">
+                  <p:tgtEl>
+                    <p:sldTgt/>
+                  </p:tgtEl>
+                </p:cond>
+              </p:nextCondLst>
+            </p:seq>
+          </p:childTnLst>
+        </p:cTn>
+      </p:par>
+    </p:tnLst>
+  </p:timing>
 </p:sld>
 </file>
 

</xml_diff>